<commit_message>
day 3 step by step
</commit_message>
<xml_diff>
--- a/ppt/day3.pptx
+++ b/ppt/day3.pptx
@@ -6,18 +6,20 @@
   </p:sldMasterIdLst>
   <p:sldIdLst>
     <p:sldId id="256" r:id="rId2"/>
-    <p:sldId id="257" r:id="rId3"/>
-    <p:sldId id="267" r:id="rId4"/>
-    <p:sldId id="258" r:id="rId5"/>
-    <p:sldId id="259" r:id="rId6"/>
-    <p:sldId id="263" r:id="rId7"/>
-    <p:sldId id="264" r:id="rId8"/>
-    <p:sldId id="265" r:id="rId9"/>
-    <p:sldId id="260" r:id="rId10"/>
-    <p:sldId id="261" r:id="rId11"/>
-    <p:sldId id="262" r:id="rId12"/>
-    <p:sldId id="268" r:id="rId13"/>
-    <p:sldId id="266" r:id="rId14"/>
+    <p:sldId id="269" r:id="rId3"/>
+    <p:sldId id="257" r:id="rId4"/>
+    <p:sldId id="267" r:id="rId5"/>
+    <p:sldId id="258" r:id="rId6"/>
+    <p:sldId id="259" r:id="rId7"/>
+    <p:sldId id="263" r:id="rId8"/>
+    <p:sldId id="264" r:id="rId9"/>
+    <p:sldId id="265" r:id="rId10"/>
+    <p:sldId id="260" r:id="rId11"/>
+    <p:sldId id="261" r:id="rId12"/>
+    <p:sldId id="262" r:id="rId13"/>
+    <p:sldId id="270" r:id="rId14"/>
+    <p:sldId id="268" r:id="rId15"/>
+    <p:sldId id="266" r:id="rId16"/>
   </p:sldIdLst>
   <p:sldSz cx="12192000" cy="6858000"/>
   <p:notesSz cx="6858000" cy="9144000"/>
@@ -3476,6 +3478,206 @@
           <a:p>
             <a:r>
               <a:rPr lang="en-GB" dirty="0"/>
+              <a:t>RSS (Residual Sum of Squares)</a:t>
+            </a:r>
+          </a:p>
+          <a:p>
+            <a:r>
+              <a:rPr lang="en-GB" dirty="0"/>
+              <a:t>A line is your model</a:t>
+            </a:r>
+          </a:p>
+          <a:p>
+            <a:pPr lvl="1"/>
+            <a:r>
+              <a:rPr lang="en-GB" dirty="0"/>
+              <a:t>You sum up all distances between model </a:t>
+            </a:r>
+            <a:br>
+              <a:rPr lang="en-GB" dirty="0"/>
+            </a:br>
+            <a:r>
+              <a:rPr lang="en-GB" dirty="0"/>
+              <a:t>and observed data</a:t>
+            </a:r>
+          </a:p>
+          <a:p>
+            <a:r>
+              <a:rPr lang="en-GB" dirty="0"/>
+              <a:t>Depends on units of data</a:t>
+            </a:r>
+          </a:p>
+          <a:p>
+            <a:pPr lvl="1"/>
+            <a:r>
+              <a:rPr lang="en-GB" dirty="0"/>
+              <a:t>See example on the right</a:t>
+            </a:r>
+          </a:p>
+          <a:p>
+            <a:pPr lvl="1"/>
+            <a:endParaRPr lang="en-GB" dirty="0"/>
+          </a:p>
+        </p:txBody>
+      </p:sp>
+      <p:pic>
+        <p:nvPicPr>
+          <p:cNvPr id="1026" name="Picture 2" descr="Beginner Q: Residual Sum Squared (RSS) and R2 - Cross Validated">
+            <a:extLst>
+              <a:ext uri="{FF2B5EF4-FFF2-40B4-BE49-F238E27FC236}">
+                <a16:creationId xmlns:a16="http://schemas.microsoft.com/office/drawing/2014/main" id="{6D70A636-DE85-A74C-A894-162A46BB7711}"/>
+              </a:ext>
+            </a:extLst>
+          </p:cNvPr>
+          <p:cNvPicPr>
+            <a:picLocks noChangeAspect="1" noChangeArrowheads="1"/>
+          </p:cNvPicPr>
+          <p:nvPr/>
+        </p:nvPicPr>
+        <p:blipFill>
+          <a:blip r:embed="rId2">
+            <a:extLst>
+              <a:ext uri="{28A0092B-C50C-407E-A947-70E740481C1C}">
+                <a14:useLocalDpi xmlns:a14="http://schemas.microsoft.com/office/drawing/2010/main" val="0"/>
+              </a:ext>
+            </a:extLst>
+          </a:blip>
+          <a:srcRect/>
+          <a:stretch>
+            <a:fillRect/>
+          </a:stretch>
+        </p:blipFill>
+        <p:spPr bwMode="auto">
+          <a:xfrm>
+            <a:off x="6737564" y="1428536"/>
+            <a:ext cx="5334571" cy="4000928"/>
+          </a:xfrm>
+          <a:prstGeom prst="rect">
+            <a:avLst/>
+          </a:prstGeom>
+          <a:noFill/>
+          <a:extLst>
+            <a:ext uri="{909E8E84-426E-40DD-AFC4-6F175D3DCCD1}">
+              <a14:hiddenFill xmlns:a14="http://schemas.microsoft.com/office/drawing/2010/main">
+                <a:solidFill>
+                  <a:srgbClr val="FFFFFF"/>
+                </a:solidFill>
+              </a14:hiddenFill>
+            </a:ext>
+          </a:extLst>
+        </p:spPr>
+      </p:pic>
+      <p:pic>
+        <p:nvPicPr>
+          <p:cNvPr id="4" name="Picture 3">
+            <a:extLst>
+              <a:ext uri="{FF2B5EF4-FFF2-40B4-BE49-F238E27FC236}">
+                <a16:creationId xmlns:a16="http://schemas.microsoft.com/office/drawing/2014/main" id="{2D32B65A-5675-EE4D-B097-2826DC69B14F}"/>
+              </a:ext>
+            </a:extLst>
+          </p:cNvPr>
+          <p:cNvPicPr>
+            <a:picLocks noChangeAspect="1"/>
+          </p:cNvPicPr>
+          <p:nvPr/>
+        </p:nvPicPr>
+        <p:blipFill>
+          <a:blip r:embed="rId3"/>
+          <a:stretch>
+            <a:fillRect/>
+          </a:stretch>
+        </p:blipFill>
+        <p:spPr>
+          <a:xfrm>
+            <a:off x="8957210" y="264220"/>
+            <a:ext cx="1346200" cy="393700"/>
+          </a:xfrm>
+          <a:prstGeom prst="rect">
+            <a:avLst/>
+          </a:prstGeom>
+        </p:spPr>
+      </p:pic>
+    </p:spTree>
+    <p:extLst>
+      <p:ext uri="{BB962C8B-B14F-4D97-AF65-F5344CB8AC3E}">
+        <p14:creationId xmlns:p14="http://schemas.microsoft.com/office/powerpoint/2010/main" val="1438039966"/>
+      </p:ext>
+    </p:extLst>
+  </p:cSld>
+  <p:clrMapOvr>
+    <a:masterClrMapping/>
+  </p:clrMapOvr>
+</p:sld>
+</file>
+
+<file path=ppt/slides/slide11.xml><?xml version="1.0" encoding="utf-8"?>
+<p:sld xmlns:a="http://schemas.openxmlformats.org/drawingml/2006/main" xmlns:r="http://schemas.openxmlformats.org/officeDocument/2006/relationships" xmlns:p="http://schemas.openxmlformats.org/presentationml/2006/main">
+  <p:cSld>
+    <p:spTree>
+      <p:nvGrpSpPr>
+        <p:cNvPr id="1" name=""/>
+        <p:cNvGrpSpPr/>
+        <p:nvPr/>
+      </p:nvGrpSpPr>
+      <p:grpSpPr>
+        <a:xfrm>
+          <a:off x="0" y="0"/>
+          <a:ext cx="0" cy="0"/>
+          <a:chOff x="0" y="0"/>
+          <a:chExt cx="0" cy="0"/>
+        </a:xfrm>
+      </p:grpSpPr>
+      <p:sp>
+        <p:nvSpPr>
+          <p:cNvPr id="2" name="Title 1">
+            <a:extLst>
+              <a:ext uri="{FF2B5EF4-FFF2-40B4-BE49-F238E27FC236}">
+                <a16:creationId xmlns:a16="http://schemas.microsoft.com/office/drawing/2014/main" id="{4915AE2B-C8D3-904D-A7D2-C8E2C0CC06ED}"/>
+              </a:ext>
+            </a:extLst>
+          </p:cNvPr>
+          <p:cNvSpPr>
+            <a:spLocks noGrp="1"/>
+          </p:cNvSpPr>
+          <p:nvPr>
+            <p:ph type="title"/>
+          </p:nvPr>
+        </p:nvSpPr>
+        <p:spPr/>
+        <p:txBody>
+          <a:bodyPr/>
+          <a:lstStyle/>
+          <a:p>
+            <a:r>
+              <a:rPr lang="en-GB" dirty="0"/>
+              <a:t>How I linear model is good?</a:t>
+            </a:r>
+          </a:p>
+        </p:txBody>
+      </p:sp>
+      <p:sp>
+        <p:nvSpPr>
+          <p:cNvPr id="3" name="Content Placeholder 2">
+            <a:extLst>
+              <a:ext uri="{FF2B5EF4-FFF2-40B4-BE49-F238E27FC236}">
+                <a16:creationId xmlns:a16="http://schemas.microsoft.com/office/drawing/2014/main" id="{7E91AEFC-A048-E84C-85D3-109262F23922}"/>
+              </a:ext>
+            </a:extLst>
+          </p:cNvPr>
+          <p:cNvSpPr>
+            <a:spLocks noGrp="1"/>
+          </p:cNvSpPr>
+          <p:nvPr>
+            <p:ph idx="1"/>
+          </p:nvPr>
+        </p:nvSpPr>
+        <p:spPr/>
+        <p:txBody>
+          <a:bodyPr/>
+          <a:lstStyle/>
+          <a:p>
+            <a:r>
+              <a:rPr lang="en-GB" dirty="0"/>
               <a:t>MSE (Mean squared error )</a:t>
             </a:r>
           </a:p>
@@ -3753,7 +3955,7 @@
 </p:sld>
 </file>
 
-<file path=ppt/slides/slide11.xml><?xml version="1.0" encoding="utf-8"?>
+<file path=ppt/slides/slide12.xml><?xml version="1.0" encoding="utf-8"?>
 <p:sld xmlns:a="http://schemas.openxmlformats.org/drawingml/2006/main" xmlns:r="http://schemas.openxmlformats.org/officeDocument/2006/relationships" xmlns:p="http://schemas.openxmlformats.org/presentationml/2006/main">
   <p:cSld>
     <p:spTree>
@@ -3860,35 +4062,35 @@
           </a:p>
           <a:p>
             <a:r>
-              <a:rPr lang="en-GB" dirty="0"/>
+              <a:rPr lang="en-GB" b="1" dirty="0"/>
               <a:t>RMSE</a:t>
             </a:r>
           </a:p>
           <a:p>
             <a:pPr lvl="1"/>
             <a:r>
-              <a:rPr lang="en-GB" dirty="0"/>
+              <a:rPr lang="en-GB" b="1" dirty="0"/>
               <a:t>is a measure of how spread out these </a:t>
             </a:r>
             <a:br>
-              <a:rPr lang="en-GB" dirty="0"/>
+              <a:rPr lang="en-GB" b="1" dirty="0"/>
             </a:br>
             <a:r>
-              <a:rPr lang="en-GB" dirty="0"/>
+              <a:rPr lang="en-GB" b="1" dirty="0"/>
               <a:t>residuals are. In other words,</a:t>
             </a:r>
             <a:br>
-              <a:rPr lang="en-GB" dirty="0"/>
+              <a:rPr lang="en-GB" b="1" dirty="0"/>
             </a:br>
             <a:r>
-              <a:rPr lang="en-GB" dirty="0"/>
+              <a:rPr lang="en-GB" b="1" dirty="0"/>
               <a:t>it tells you how concentrated the </a:t>
             </a:r>
             <a:br>
-              <a:rPr lang="en-GB" dirty="0"/>
+              <a:rPr lang="en-GB" b="1" dirty="0"/>
             </a:br>
             <a:r>
-              <a:rPr lang="en-GB" dirty="0"/>
+              <a:rPr lang="en-GB" b="1" dirty="0"/>
               <a:t>data is around the line of best fit.</a:t>
             </a:r>
           </a:p>
@@ -4018,7 +4220,338 @@
 </p:sld>
 </file>
 
-<file path=ppt/slides/slide12.xml><?xml version="1.0" encoding="utf-8"?>
+<file path=ppt/slides/slide13.xml><?xml version="1.0" encoding="utf-8"?>
+<p:sld xmlns:a="http://schemas.openxmlformats.org/drawingml/2006/main" xmlns:r="http://schemas.openxmlformats.org/officeDocument/2006/relationships" xmlns:p="http://schemas.openxmlformats.org/presentationml/2006/main">
+  <p:cSld>
+    <p:spTree>
+      <p:nvGrpSpPr>
+        <p:cNvPr id="1" name=""/>
+        <p:cNvGrpSpPr/>
+        <p:nvPr/>
+      </p:nvGrpSpPr>
+      <p:grpSpPr>
+        <a:xfrm>
+          <a:off x="0" y="0"/>
+          <a:ext cx="0" cy="0"/>
+          <a:chOff x="0" y="0"/>
+          <a:chExt cx="0" cy="0"/>
+        </a:xfrm>
+      </p:grpSpPr>
+      <p:sp>
+        <p:nvSpPr>
+          <p:cNvPr id="2" name="Title 1">
+            <a:extLst>
+              <a:ext uri="{FF2B5EF4-FFF2-40B4-BE49-F238E27FC236}">
+                <a16:creationId xmlns:a16="http://schemas.microsoft.com/office/drawing/2014/main" id="{F8E45E8F-2D48-1D4F-B18D-AAF4ECCE0647}"/>
+              </a:ext>
+            </a:extLst>
+          </p:cNvPr>
+          <p:cNvSpPr>
+            <a:spLocks noGrp="1"/>
+          </p:cNvSpPr>
+          <p:nvPr>
+            <p:ph type="title"/>
+          </p:nvPr>
+        </p:nvSpPr>
+        <p:spPr/>
+        <p:txBody>
+          <a:bodyPr/>
+          <a:lstStyle/>
+          <a:p>
+            <a:r>
+              <a:rPr lang="en-GB" dirty="0"/>
+              <a:t>Which parameter is useful?</a:t>
+            </a:r>
+          </a:p>
+        </p:txBody>
+      </p:sp>
+      <p:sp>
+        <p:nvSpPr>
+          <p:cNvPr id="3" name="Content Placeholder 2">
+            <a:extLst>
+              <a:ext uri="{FF2B5EF4-FFF2-40B4-BE49-F238E27FC236}">
+                <a16:creationId xmlns:a16="http://schemas.microsoft.com/office/drawing/2014/main" id="{77C2AB17-475F-C346-BBB9-2071170687DE}"/>
+              </a:ext>
+            </a:extLst>
+          </p:cNvPr>
+          <p:cNvSpPr>
+            <a:spLocks noGrp="1"/>
+          </p:cNvSpPr>
+          <p:nvPr>
+            <p:ph idx="1"/>
+          </p:nvPr>
+        </p:nvSpPr>
+        <p:spPr/>
+        <p:txBody>
+          <a:bodyPr/>
+          <a:lstStyle/>
+          <a:p>
+            <a:r>
+              <a:rPr lang="en-GB" dirty="0"/>
+              <a:t>Do correlation analysis with all possibilities</a:t>
+            </a:r>
+          </a:p>
+          <a:p>
+            <a:r>
+              <a:rPr lang="en-GB" dirty="0"/>
+              <a:t>Make a </a:t>
+            </a:r>
+            <a:r>
+              <a:rPr lang="en-GB"/>
+              <a:t>model summary </a:t>
+            </a:r>
+            <a:r>
+              <a:rPr lang="en-GB" dirty="0"/>
+              <a:t>and observe P-value under F-statistics</a:t>
+            </a:r>
+          </a:p>
+          <a:p>
+            <a:r>
+              <a:rPr lang="en-GB" dirty="0"/>
+              <a:t>Look how R^2 is changing</a:t>
+            </a:r>
+          </a:p>
+          <a:p>
+            <a:r>
+              <a:rPr lang="en-GB" dirty="0"/>
+              <a:t>Try different combinations of </a:t>
+            </a:r>
+            <a:br>
+              <a:rPr lang="en-GB" dirty="0"/>
+            </a:br>
+            <a:r>
+              <a:rPr lang="en-GB" dirty="0"/>
+              <a:t>parameters and observe the </a:t>
+            </a:r>
+            <a:br>
+              <a:rPr lang="en-GB" dirty="0"/>
+            </a:br>
+            <a:r>
+              <a:rPr lang="en-GB" dirty="0"/>
+              <a:t>change</a:t>
+            </a:r>
+          </a:p>
+          <a:p>
+            <a:endParaRPr lang="en-GB" dirty="0"/>
+          </a:p>
+        </p:txBody>
+      </p:sp>
+      <p:pic>
+        <p:nvPicPr>
+          <p:cNvPr id="4" name="Picture 3">
+            <a:extLst>
+              <a:ext uri="{FF2B5EF4-FFF2-40B4-BE49-F238E27FC236}">
+                <a16:creationId xmlns:a16="http://schemas.microsoft.com/office/drawing/2014/main" id="{B95294BD-9267-A945-947A-21D843B76963}"/>
+              </a:ext>
+            </a:extLst>
+          </p:cNvPr>
+          <p:cNvPicPr>
+            <a:picLocks noChangeAspect="1"/>
+          </p:cNvPicPr>
+          <p:nvPr/>
+        </p:nvPicPr>
+        <p:blipFill>
+          <a:blip r:embed="rId2"/>
+          <a:stretch>
+            <a:fillRect/>
+          </a:stretch>
+        </p:blipFill>
+        <p:spPr>
+          <a:xfrm>
+            <a:off x="6526873" y="3524036"/>
+            <a:ext cx="5406180" cy="3093948"/>
+          </a:xfrm>
+          <a:prstGeom prst="rect">
+            <a:avLst/>
+          </a:prstGeom>
+        </p:spPr>
+      </p:pic>
+      <p:sp>
+        <p:nvSpPr>
+          <p:cNvPr id="5" name="Rectangle 4">
+            <a:extLst>
+              <a:ext uri="{FF2B5EF4-FFF2-40B4-BE49-F238E27FC236}">
+                <a16:creationId xmlns:a16="http://schemas.microsoft.com/office/drawing/2014/main" id="{704046B6-7B6E-FF4D-82F6-636E2AA97F57}"/>
+              </a:ext>
+            </a:extLst>
+          </p:cNvPr>
+          <p:cNvSpPr/>
+          <p:nvPr/>
+        </p:nvSpPr>
+        <p:spPr>
+          <a:xfrm>
+            <a:off x="10068674" y="3637052"/>
+            <a:ext cx="1212351" cy="1695236"/>
+          </a:xfrm>
+          <a:prstGeom prst="rect">
+            <a:avLst/>
+          </a:prstGeom>
+          <a:noFill/>
+        </p:spPr>
+        <p:style>
+          <a:lnRef idx="2">
+            <a:schemeClr val="accent1">
+              <a:shade val="50000"/>
+            </a:schemeClr>
+          </a:lnRef>
+          <a:fillRef idx="1">
+            <a:schemeClr val="accent1"/>
+          </a:fillRef>
+          <a:effectRef idx="0">
+            <a:schemeClr val="accent1"/>
+          </a:effectRef>
+          <a:fontRef idx="minor">
+            <a:schemeClr val="lt1"/>
+          </a:fontRef>
+        </p:style>
+        <p:txBody>
+          <a:bodyPr rtlCol="0" anchor="ctr"/>
+          <a:lstStyle/>
+          <a:p>
+            <a:pPr algn="ctr"/>
+            <a:endParaRPr lang="en-GB"/>
+          </a:p>
+        </p:txBody>
+      </p:sp>
+      <p:sp>
+        <p:nvSpPr>
+          <p:cNvPr id="6" name="Rectangle 5">
+            <a:extLst>
+              <a:ext uri="{FF2B5EF4-FFF2-40B4-BE49-F238E27FC236}">
+                <a16:creationId xmlns:a16="http://schemas.microsoft.com/office/drawing/2014/main" id="{5211C65F-73F3-C641-996B-3B3F41D86FC9}"/>
+              </a:ext>
+            </a:extLst>
+          </p:cNvPr>
+          <p:cNvSpPr/>
+          <p:nvPr/>
+        </p:nvSpPr>
+        <p:spPr>
+          <a:xfrm>
+            <a:off x="9172871" y="6093931"/>
+            <a:ext cx="2416378" cy="217969"/>
+          </a:xfrm>
+          <a:prstGeom prst="rect">
+            <a:avLst/>
+          </a:prstGeom>
+          <a:noFill/>
+        </p:spPr>
+        <p:style>
+          <a:lnRef idx="2">
+            <a:schemeClr val="accent1">
+              <a:shade val="50000"/>
+            </a:schemeClr>
+          </a:lnRef>
+          <a:fillRef idx="1">
+            <a:schemeClr val="accent1"/>
+          </a:fillRef>
+          <a:effectRef idx="0">
+            <a:schemeClr val="accent1"/>
+          </a:effectRef>
+          <a:fontRef idx="minor">
+            <a:schemeClr val="lt1"/>
+          </a:fontRef>
+        </p:style>
+        <p:txBody>
+          <a:bodyPr rtlCol="0" anchor="ctr"/>
+          <a:lstStyle/>
+          <a:p>
+            <a:pPr algn="ctr"/>
+            <a:endParaRPr lang="en-GB"/>
+          </a:p>
+        </p:txBody>
+      </p:sp>
+      <p:cxnSp>
+        <p:nvCxnSpPr>
+          <p:cNvPr id="8" name="Straight Arrow Connector 7">
+            <a:extLst>
+              <a:ext uri="{FF2B5EF4-FFF2-40B4-BE49-F238E27FC236}">
+                <a16:creationId xmlns:a16="http://schemas.microsoft.com/office/drawing/2014/main" id="{DFE5B30B-6EDB-EF48-A7E1-8CF83160C067}"/>
+              </a:ext>
+            </a:extLst>
+          </p:cNvPr>
+          <p:cNvCxnSpPr/>
+          <p:nvPr/>
+        </p:nvCxnSpPr>
+        <p:spPr>
+          <a:xfrm>
+            <a:off x="8332342" y="2599362"/>
+            <a:ext cx="1736332" cy="924674"/>
+          </a:xfrm>
+          <a:prstGeom prst="straightConnector1">
+            <a:avLst/>
+          </a:prstGeom>
+          <a:ln>
+            <a:tailEnd type="triangle"/>
+          </a:ln>
+        </p:spPr>
+        <p:style>
+          <a:lnRef idx="1">
+            <a:schemeClr val="accent1"/>
+          </a:lnRef>
+          <a:fillRef idx="0">
+            <a:schemeClr val="accent1"/>
+          </a:fillRef>
+          <a:effectRef idx="0">
+            <a:schemeClr val="accent1"/>
+          </a:effectRef>
+          <a:fontRef idx="minor">
+            <a:schemeClr val="tx1"/>
+          </a:fontRef>
+        </p:style>
+      </p:cxnSp>
+      <p:cxnSp>
+        <p:nvCxnSpPr>
+          <p:cNvPr id="10" name="Straight Arrow Connector 9">
+            <a:extLst>
+              <a:ext uri="{FF2B5EF4-FFF2-40B4-BE49-F238E27FC236}">
+                <a16:creationId xmlns:a16="http://schemas.microsoft.com/office/drawing/2014/main" id="{8F245CE8-05EF-574B-BB50-E8E6B148AC99}"/>
+              </a:ext>
+            </a:extLst>
+          </p:cNvPr>
+          <p:cNvCxnSpPr/>
+          <p:nvPr/>
+        </p:nvCxnSpPr>
+        <p:spPr>
+          <a:xfrm>
+            <a:off x="4900773" y="3051425"/>
+            <a:ext cx="4181582" cy="2907569"/>
+          </a:xfrm>
+          <a:prstGeom prst="straightConnector1">
+            <a:avLst/>
+          </a:prstGeom>
+          <a:ln>
+            <a:tailEnd type="triangle"/>
+          </a:ln>
+        </p:spPr>
+        <p:style>
+          <a:lnRef idx="1">
+            <a:schemeClr val="accent1"/>
+          </a:lnRef>
+          <a:fillRef idx="0">
+            <a:schemeClr val="accent1"/>
+          </a:fillRef>
+          <a:effectRef idx="0">
+            <a:schemeClr val="accent1"/>
+          </a:effectRef>
+          <a:fontRef idx="minor">
+            <a:schemeClr val="tx1"/>
+          </a:fontRef>
+        </p:style>
+      </p:cxnSp>
+    </p:spTree>
+    <p:extLst>
+      <p:ext uri="{BB962C8B-B14F-4D97-AF65-F5344CB8AC3E}">
+        <p14:creationId xmlns:p14="http://schemas.microsoft.com/office/powerpoint/2010/main" val="3374266898"/>
+      </p:ext>
+    </p:extLst>
+  </p:cSld>
+  <p:clrMapOvr>
+    <a:masterClrMapping/>
+  </p:clrMapOvr>
+</p:sld>
+</file>
+
+<file path=ppt/slides/slide14.xml><?xml version="1.0" encoding="utf-8"?>
 <p:sld xmlns:a="http://schemas.openxmlformats.org/drawingml/2006/main" xmlns:r="http://schemas.openxmlformats.org/officeDocument/2006/relationships" xmlns:p="http://schemas.openxmlformats.org/presentationml/2006/main">
   <p:cSld>
     <p:spTree>
@@ -4195,7 +4728,7 @@
 </p:sld>
 </file>
 
-<file path=ppt/slides/slide13.xml><?xml version="1.0" encoding="utf-8"?>
+<file path=ppt/slides/slide15.xml><?xml version="1.0" encoding="utf-8"?>
 <p:sld xmlns:a="http://schemas.openxmlformats.org/drawingml/2006/main" xmlns:r="http://schemas.openxmlformats.org/officeDocument/2006/relationships" xmlns:p="http://schemas.openxmlformats.org/presentationml/2006/main">
   <p:cSld>
     <p:spTree>
@@ -4279,6 +4812,135 @@
 </file>
 
 <file path=ppt/slides/slide2.xml><?xml version="1.0" encoding="utf-8"?>
+<p:sld xmlns:a="http://schemas.openxmlformats.org/drawingml/2006/main" xmlns:r="http://schemas.openxmlformats.org/officeDocument/2006/relationships" xmlns:p="http://schemas.openxmlformats.org/presentationml/2006/main">
+  <p:cSld>
+    <p:spTree>
+      <p:nvGrpSpPr>
+        <p:cNvPr id="1" name=""/>
+        <p:cNvGrpSpPr/>
+        <p:nvPr/>
+      </p:nvGrpSpPr>
+      <p:grpSpPr>
+        <a:xfrm>
+          <a:off x="0" y="0"/>
+          <a:ext cx="0" cy="0"/>
+          <a:chOff x="0" y="0"/>
+          <a:chExt cx="0" cy="0"/>
+        </a:xfrm>
+      </p:grpSpPr>
+      <p:sp>
+        <p:nvSpPr>
+          <p:cNvPr id="2" name="Title 1">
+            <a:extLst>
+              <a:ext uri="{FF2B5EF4-FFF2-40B4-BE49-F238E27FC236}">
+                <a16:creationId xmlns:a16="http://schemas.microsoft.com/office/drawing/2014/main" id="{458EA246-59AB-E146-BD50-4668172E93F9}"/>
+              </a:ext>
+            </a:extLst>
+          </p:cNvPr>
+          <p:cNvSpPr>
+            <a:spLocks noGrp="1"/>
+          </p:cNvSpPr>
+          <p:nvPr>
+            <p:ph type="title"/>
+          </p:nvPr>
+        </p:nvSpPr>
+        <p:spPr/>
+        <p:txBody>
+          <a:bodyPr/>
+          <a:lstStyle/>
+          <a:p>
+            <a:r>
+              <a:rPr lang="en-GB" dirty="0"/>
+              <a:t>We start by downloading the </a:t>
+            </a:r>
+            <a:r>
+              <a:rPr lang="en-GB" dirty="0" err="1"/>
+              <a:t>github</a:t>
+            </a:r>
+            <a:r>
+              <a:rPr lang="en-GB" dirty="0"/>
+              <a:t> folder</a:t>
+            </a:r>
+          </a:p>
+        </p:txBody>
+      </p:sp>
+      <p:sp>
+        <p:nvSpPr>
+          <p:cNvPr id="3" name="Content Placeholder 2">
+            <a:extLst>
+              <a:ext uri="{FF2B5EF4-FFF2-40B4-BE49-F238E27FC236}">
+                <a16:creationId xmlns:a16="http://schemas.microsoft.com/office/drawing/2014/main" id="{2339C265-F72E-C24E-AED4-A1B154504695}"/>
+              </a:ext>
+            </a:extLst>
+          </p:cNvPr>
+          <p:cNvSpPr>
+            <a:spLocks noGrp="1"/>
+          </p:cNvSpPr>
+          <p:nvPr>
+            <p:ph idx="1"/>
+          </p:nvPr>
+        </p:nvSpPr>
+        <p:spPr/>
+        <p:txBody>
+          <a:bodyPr/>
+          <a:lstStyle/>
+          <a:p>
+            <a:r>
+              <a:rPr lang="en-GB" dirty="0">
+                <a:hlinkClick r:id="rId2"/>
+              </a:rPr>
+              <a:t>https://github.com/mxs3203/RIT_DataScience_Seminar</a:t>
+            </a:r>
+            <a:endParaRPr lang="en-GB" dirty="0"/>
+          </a:p>
+          <a:p>
+            <a:pPr lvl="1"/>
+            <a:r>
+              <a:rPr lang="en-GB" dirty="0"/>
+              <a:t>***Copy to zoom chat</a:t>
+            </a:r>
+          </a:p>
+          <a:p>
+            <a:endParaRPr lang="en-GB" dirty="0"/>
+          </a:p>
+          <a:p>
+            <a:r>
+              <a:rPr lang="en-GB" dirty="0"/>
+              <a:t>You can download the folder on this link</a:t>
+            </a:r>
+          </a:p>
+          <a:p>
+            <a:r>
+              <a:rPr lang="en-GB" dirty="0"/>
+              <a:t>I wrote some starter code so we can focus on new topics</a:t>
+            </a:r>
+          </a:p>
+          <a:p>
+            <a:pPr lvl="1"/>
+            <a:r>
+              <a:rPr lang="en-GB" dirty="0"/>
+              <a:t>It is just loading the data and comments </a:t>
+            </a:r>
+          </a:p>
+          <a:p>
+            <a:endParaRPr lang="en-GB" dirty="0"/>
+          </a:p>
+        </p:txBody>
+      </p:sp>
+    </p:spTree>
+    <p:extLst>
+      <p:ext uri="{BB962C8B-B14F-4D97-AF65-F5344CB8AC3E}">
+        <p14:creationId xmlns:p14="http://schemas.microsoft.com/office/powerpoint/2010/main" val="737791954"/>
+      </p:ext>
+    </p:extLst>
+  </p:cSld>
+  <p:clrMapOvr>
+    <a:masterClrMapping/>
+  </p:clrMapOvr>
+</p:sld>
+</file>
+
+<file path=ppt/slides/slide3.xml><?xml version="1.0" encoding="utf-8"?>
 <p:sld xmlns:a="http://schemas.openxmlformats.org/drawingml/2006/main" xmlns:r="http://schemas.openxmlformats.org/officeDocument/2006/relationships" xmlns:p="http://schemas.openxmlformats.org/presentationml/2006/main">
   <p:cSld>
     <p:spTree>
@@ -4624,7 +5286,7 @@
 </p:sld>
 </file>
 
-<file path=ppt/slides/slide3.xml><?xml version="1.0" encoding="utf-8"?>
+<file path=ppt/slides/slide4.xml><?xml version="1.0" encoding="utf-8"?>
 <p:sld xmlns:a="http://schemas.openxmlformats.org/drawingml/2006/main" xmlns:r="http://schemas.openxmlformats.org/officeDocument/2006/relationships" xmlns:p="http://schemas.openxmlformats.org/presentationml/2006/main">
   <p:cSld>
     <p:spTree>
@@ -4748,7 +5410,7 @@
 </p:sld>
 </file>
 
-<file path=ppt/slides/slide4.xml><?xml version="1.0" encoding="utf-8"?>
+<file path=ppt/slides/slide5.xml><?xml version="1.0" encoding="utf-8"?>
 <p:sld xmlns:a="http://schemas.openxmlformats.org/drawingml/2006/main" xmlns:r="http://schemas.openxmlformats.org/officeDocument/2006/relationships" xmlns:p="http://schemas.openxmlformats.org/presentationml/2006/main">
   <p:cSld>
     <p:spTree>
@@ -5012,7 +5674,7 @@
 </p:sld>
 </file>
 
-<file path=ppt/slides/slide5.xml><?xml version="1.0" encoding="utf-8"?>
+<file path=ppt/slides/slide6.xml><?xml version="1.0" encoding="utf-8"?>
 <p:sld xmlns:a="http://schemas.openxmlformats.org/drawingml/2006/main" xmlns:r="http://schemas.openxmlformats.org/officeDocument/2006/relationships" xmlns:p="http://schemas.openxmlformats.org/presentationml/2006/main">
   <p:cSld>
     <p:spTree>
@@ -5145,7 +5807,7 @@
 </p:sld>
 </file>
 
-<file path=ppt/slides/slide6.xml><?xml version="1.0" encoding="utf-8"?>
+<file path=ppt/slides/slide7.xml><?xml version="1.0" encoding="utf-8"?>
 <p:sld xmlns:a="http://schemas.openxmlformats.org/drawingml/2006/main" xmlns:r="http://schemas.openxmlformats.org/officeDocument/2006/relationships" xmlns:p="http://schemas.openxmlformats.org/presentationml/2006/main">
   <p:cSld>
     <p:spTree>
@@ -5318,7 +5980,7 @@
 </p:sld>
 </file>
 
-<file path=ppt/slides/slide7.xml><?xml version="1.0" encoding="utf-8"?>
+<file path=ppt/slides/slide8.xml><?xml version="1.0" encoding="utf-8"?>
 <p:sld xmlns:a="http://schemas.openxmlformats.org/drawingml/2006/main" xmlns:r="http://schemas.openxmlformats.org/officeDocument/2006/relationships" xmlns:p="http://schemas.openxmlformats.org/presentationml/2006/main">
   <p:cSld>
     <p:spTree>
@@ -5463,7 +6125,7 @@
 </p:sld>
 </file>
 
-<file path=ppt/slides/slide8.xml><?xml version="1.0" encoding="utf-8"?>
+<file path=ppt/slides/slide9.xml><?xml version="1.0" encoding="utf-8"?>
 <p:sld xmlns:a="http://schemas.openxmlformats.org/drawingml/2006/main" xmlns:r="http://schemas.openxmlformats.org/officeDocument/2006/relationships" xmlns:p="http://schemas.openxmlformats.org/presentationml/2006/main">
   <p:cSld>
     <p:spTree>
@@ -5677,206 +6339,6 @@
     <p:extLst>
       <p:ext uri="{BB962C8B-B14F-4D97-AF65-F5344CB8AC3E}">
         <p14:creationId xmlns:p14="http://schemas.microsoft.com/office/powerpoint/2010/main" val="1060349299"/>
-      </p:ext>
-    </p:extLst>
-  </p:cSld>
-  <p:clrMapOvr>
-    <a:masterClrMapping/>
-  </p:clrMapOvr>
-</p:sld>
-</file>
-
-<file path=ppt/slides/slide9.xml><?xml version="1.0" encoding="utf-8"?>
-<p:sld xmlns:a="http://schemas.openxmlformats.org/drawingml/2006/main" xmlns:r="http://schemas.openxmlformats.org/officeDocument/2006/relationships" xmlns:p="http://schemas.openxmlformats.org/presentationml/2006/main">
-  <p:cSld>
-    <p:spTree>
-      <p:nvGrpSpPr>
-        <p:cNvPr id="1" name=""/>
-        <p:cNvGrpSpPr/>
-        <p:nvPr/>
-      </p:nvGrpSpPr>
-      <p:grpSpPr>
-        <a:xfrm>
-          <a:off x="0" y="0"/>
-          <a:ext cx="0" cy="0"/>
-          <a:chOff x="0" y="0"/>
-          <a:chExt cx="0" cy="0"/>
-        </a:xfrm>
-      </p:grpSpPr>
-      <p:sp>
-        <p:nvSpPr>
-          <p:cNvPr id="2" name="Title 1">
-            <a:extLst>
-              <a:ext uri="{FF2B5EF4-FFF2-40B4-BE49-F238E27FC236}">
-                <a16:creationId xmlns:a16="http://schemas.microsoft.com/office/drawing/2014/main" id="{4915AE2B-C8D3-904D-A7D2-C8E2C0CC06ED}"/>
-              </a:ext>
-            </a:extLst>
-          </p:cNvPr>
-          <p:cNvSpPr>
-            <a:spLocks noGrp="1"/>
-          </p:cNvSpPr>
-          <p:nvPr>
-            <p:ph type="title"/>
-          </p:nvPr>
-        </p:nvSpPr>
-        <p:spPr/>
-        <p:txBody>
-          <a:bodyPr/>
-          <a:lstStyle/>
-          <a:p>
-            <a:r>
-              <a:rPr lang="en-GB" dirty="0"/>
-              <a:t>How I linear model is good?</a:t>
-            </a:r>
-          </a:p>
-        </p:txBody>
-      </p:sp>
-      <p:sp>
-        <p:nvSpPr>
-          <p:cNvPr id="3" name="Content Placeholder 2">
-            <a:extLst>
-              <a:ext uri="{FF2B5EF4-FFF2-40B4-BE49-F238E27FC236}">
-                <a16:creationId xmlns:a16="http://schemas.microsoft.com/office/drawing/2014/main" id="{7E91AEFC-A048-E84C-85D3-109262F23922}"/>
-              </a:ext>
-            </a:extLst>
-          </p:cNvPr>
-          <p:cNvSpPr>
-            <a:spLocks noGrp="1"/>
-          </p:cNvSpPr>
-          <p:nvPr>
-            <p:ph idx="1"/>
-          </p:nvPr>
-        </p:nvSpPr>
-        <p:spPr/>
-        <p:txBody>
-          <a:bodyPr/>
-          <a:lstStyle/>
-          <a:p>
-            <a:r>
-              <a:rPr lang="en-GB" dirty="0"/>
-              <a:t>RSS (Residual Sum of Squares)</a:t>
-            </a:r>
-          </a:p>
-          <a:p>
-            <a:r>
-              <a:rPr lang="en-GB" dirty="0"/>
-              <a:t>A line is your model</a:t>
-            </a:r>
-          </a:p>
-          <a:p>
-            <a:pPr lvl="1"/>
-            <a:r>
-              <a:rPr lang="en-GB" dirty="0"/>
-              <a:t>You sum up all distances between model </a:t>
-            </a:r>
-            <a:br>
-              <a:rPr lang="en-GB" dirty="0"/>
-            </a:br>
-            <a:r>
-              <a:rPr lang="en-GB" dirty="0"/>
-              <a:t>and observed data</a:t>
-            </a:r>
-          </a:p>
-          <a:p>
-            <a:r>
-              <a:rPr lang="en-GB" dirty="0"/>
-              <a:t>Depends on units of data</a:t>
-            </a:r>
-          </a:p>
-          <a:p>
-            <a:pPr lvl="1"/>
-            <a:r>
-              <a:rPr lang="en-GB" dirty="0"/>
-              <a:t>See example on the right</a:t>
-            </a:r>
-          </a:p>
-          <a:p>
-            <a:pPr lvl="1"/>
-            <a:endParaRPr lang="en-GB" dirty="0"/>
-          </a:p>
-        </p:txBody>
-      </p:sp>
-      <p:pic>
-        <p:nvPicPr>
-          <p:cNvPr id="1026" name="Picture 2" descr="Beginner Q: Residual Sum Squared (RSS) and R2 - Cross Validated">
-            <a:extLst>
-              <a:ext uri="{FF2B5EF4-FFF2-40B4-BE49-F238E27FC236}">
-                <a16:creationId xmlns:a16="http://schemas.microsoft.com/office/drawing/2014/main" id="{6D70A636-DE85-A74C-A894-162A46BB7711}"/>
-              </a:ext>
-            </a:extLst>
-          </p:cNvPr>
-          <p:cNvPicPr>
-            <a:picLocks noChangeAspect="1" noChangeArrowheads="1"/>
-          </p:cNvPicPr>
-          <p:nvPr/>
-        </p:nvPicPr>
-        <p:blipFill>
-          <a:blip r:embed="rId2">
-            <a:extLst>
-              <a:ext uri="{28A0092B-C50C-407E-A947-70E740481C1C}">
-                <a14:useLocalDpi xmlns:a14="http://schemas.microsoft.com/office/drawing/2010/main" val="0"/>
-              </a:ext>
-            </a:extLst>
-          </a:blip>
-          <a:srcRect/>
-          <a:stretch>
-            <a:fillRect/>
-          </a:stretch>
-        </p:blipFill>
-        <p:spPr bwMode="auto">
-          <a:xfrm>
-            <a:off x="6737564" y="1428536"/>
-            <a:ext cx="5334571" cy="4000928"/>
-          </a:xfrm>
-          <a:prstGeom prst="rect">
-            <a:avLst/>
-          </a:prstGeom>
-          <a:noFill/>
-          <a:extLst>
-            <a:ext uri="{909E8E84-426E-40DD-AFC4-6F175D3DCCD1}">
-              <a14:hiddenFill xmlns:a14="http://schemas.microsoft.com/office/drawing/2010/main">
-                <a:solidFill>
-                  <a:srgbClr val="FFFFFF"/>
-                </a:solidFill>
-              </a14:hiddenFill>
-            </a:ext>
-          </a:extLst>
-        </p:spPr>
-      </p:pic>
-      <p:pic>
-        <p:nvPicPr>
-          <p:cNvPr id="4" name="Picture 3">
-            <a:extLst>
-              <a:ext uri="{FF2B5EF4-FFF2-40B4-BE49-F238E27FC236}">
-                <a16:creationId xmlns:a16="http://schemas.microsoft.com/office/drawing/2014/main" id="{2D32B65A-5675-EE4D-B097-2826DC69B14F}"/>
-              </a:ext>
-            </a:extLst>
-          </p:cNvPr>
-          <p:cNvPicPr>
-            <a:picLocks noChangeAspect="1"/>
-          </p:cNvPicPr>
-          <p:nvPr/>
-        </p:nvPicPr>
-        <p:blipFill>
-          <a:blip r:embed="rId3"/>
-          <a:stretch>
-            <a:fillRect/>
-          </a:stretch>
-        </p:blipFill>
-        <p:spPr>
-          <a:xfrm>
-            <a:off x="8957210" y="264220"/>
-            <a:ext cx="1346200" cy="393700"/>
-          </a:xfrm>
-          <a:prstGeom prst="rect">
-            <a:avLst/>
-          </a:prstGeom>
-        </p:spPr>
-      </p:pic>
-    </p:spTree>
-    <p:extLst>
-      <p:ext uri="{BB962C8B-B14F-4D97-AF65-F5344CB8AC3E}">
-        <p14:creationId xmlns:p14="http://schemas.microsoft.com/office/powerpoint/2010/main" val="1438039966"/>
       </p:ext>
     </p:extLst>
   </p:cSld>

</xml_diff>